<commit_message>
fix the work framework chart
</commit_message>
<xml_diff>
--- a/insight.pptx
+++ b/insight.pptx
@@ -4332,6 +4332,215 @@
           </a:p>
         </p:txBody>
       </p:sp>
+      <p:cxnSp>
+        <p:nvCxnSpPr>
+          <p:cNvPr id="12" name="Straight Arrow Connector 11">
+            <a:extLst>
+              <a:ext uri="{FF2B5EF4-FFF2-40B4-BE49-F238E27FC236}">
+                <a16:creationId xmlns:a16="http://schemas.microsoft.com/office/drawing/2014/main" id="{48610B49-C09C-43D5-AA04-4037D5E4124A}"/>
+              </a:ext>
+            </a:extLst>
+          </p:cNvPr>
+          <p:cNvCxnSpPr>
+            <a:stCxn id="4" idx="3"/>
+            <a:endCxn id="5" idx="1"/>
+          </p:cNvCxnSpPr>
+          <p:nvPr/>
+        </p:nvCxnSpPr>
+        <p:spPr>
+          <a:xfrm flipV="1">
+            <a:off x="2209800" y="3013523"/>
+            <a:ext cx="297549" cy="6"/>
+          </a:xfrm>
+          <a:prstGeom prst="straightConnector1">
+            <a:avLst/>
+          </a:prstGeom>
+          <a:ln>
+            <a:tailEnd type="triangle"/>
+          </a:ln>
+        </p:spPr>
+        <p:style>
+          <a:lnRef idx="1">
+            <a:schemeClr val="accent1"/>
+          </a:lnRef>
+          <a:fillRef idx="0">
+            <a:schemeClr val="accent1"/>
+          </a:fillRef>
+          <a:effectRef idx="0">
+            <a:schemeClr val="accent1"/>
+          </a:effectRef>
+          <a:fontRef idx="minor">
+            <a:schemeClr val="tx1"/>
+          </a:fontRef>
+        </p:style>
+      </p:cxnSp>
+      <p:cxnSp>
+        <p:nvCxnSpPr>
+          <p:cNvPr id="14" name="Straight Arrow Connector 13">
+            <a:extLst>
+              <a:ext uri="{FF2B5EF4-FFF2-40B4-BE49-F238E27FC236}">
+                <a16:creationId xmlns:a16="http://schemas.microsoft.com/office/drawing/2014/main" id="{09E2FECA-5C51-4D7C-8890-09136199521A}"/>
+              </a:ext>
+            </a:extLst>
+          </p:cNvPr>
+          <p:cNvCxnSpPr>
+            <a:stCxn id="5" idx="3"/>
+            <a:endCxn id="6" idx="1"/>
+          </p:cNvCxnSpPr>
+          <p:nvPr/>
+        </p:nvCxnSpPr>
+        <p:spPr>
+          <a:xfrm>
+            <a:off x="4031349" y="3013523"/>
+            <a:ext cx="348348" cy="0"/>
+          </a:xfrm>
+          <a:prstGeom prst="straightConnector1">
+            <a:avLst/>
+          </a:prstGeom>
+          <a:ln>
+            <a:tailEnd type="triangle"/>
+          </a:ln>
+        </p:spPr>
+        <p:style>
+          <a:lnRef idx="1">
+            <a:schemeClr val="accent1"/>
+          </a:lnRef>
+          <a:fillRef idx="0">
+            <a:schemeClr val="accent1"/>
+          </a:fillRef>
+          <a:effectRef idx="0">
+            <a:schemeClr val="accent1"/>
+          </a:effectRef>
+          <a:fontRef idx="minor">
+            <a:schemeClr val="tx1"/>
+          </a:fontRef>
+        </p:style>
+      </p:cxnSp>
+      <p:cxnSp>
+        <p:nvCxnSpPr>
+          <p:cNvPr id="16" name="Straight Arrow Connector 15">
+            <a:extLst>
+              <a:ext uri="{FF2B5EF4-FFF2-40B4-BE49-F238E27FC236}">
+                <a16:creationId xmlns:a16="http://schemas.microsoft.com/office/drawing/2014/main" id="{98B62A17-21A5-4268-A539-CE4E66E130CE}"/>
+              </a:ext>
+            </a:extLst>
+          </p:cNvPr>
+          <p:cNvCxnSpPr>
+            <a:stCxn id="6" idx="3"/>
+            <a:endCxn id="7" idx="1"/>
+          </p:cNvCxnSpPr>
+          <p:nvPr/>
+        </p:nvCxnSpPr>
+        <p:spPr>
+          <a:xfrm>
+            <a:off x="5903697" y="3013523"/>
+            <a:ext cx="348348" cy="8"/>
+          </a:xfrm>
+          <a:prstGeom prst="straightConnector1">
+            <a:avLst/>
+          </a:prstGeom>
+          <a:ln>
+            <a:tailEnd type="triangle"/>
+          </a:ln>
+        </p:spPr>
+        <p:style>
+          <a:lnRef idx="1">
+            <a:schemeClr val="accent1"/>
+          </a:lnRef>
+          <a:fillRef idx="0">
+            <a:schemeClr val="accent1"/>
+          </a:fillRef>
+          <a:effectRef idx="0">
+            <a:schemeClr val="accent1"/>
+          </a:effectRef>
+          <a:fontRef idx="minor">
+            <a:schemeClr val="tx1"/>
+          </a:fontRef>
+        </p:style>
+      </p:cxnSp>
+      <p:cxnSp>
+        <p:nvCxnSpPr>
+          <p:cNvPr id="18" name="Straight Arrow Connector 17">
+            <a:extLst>
+              <a:ext uri="{FF2B5EF4-FFF2-40B4-BE49-F238E27FC236}">
+                <a16:creationId xmlns:a16="http://schemas.microsoft.com/office/drawing/2014/main" id="{FEA04471-7A97-4FD9-B64C-CAEEDD40FE86}"/>
+              </a:ext>
+            </a:extLst>
+          </p:cNvPr>
+          <p:cNvCxnSpPr>
+            <a:endCxn id="8" idx="1"/>
+          </p:cNvCxnSpPr>
+          <p:nvPr/>
+        </p:nvCxnSpPr>
+        <p:spPr>
+          <a:xfrm flipV="1">
+            <a:off x="8030043" y="3013522"/>
+            <a:ext cx="279409" cy="1"/>
+          </a:xfrm>
+          <a:prstGeom prst="straightConnector1">
+            <a:avLst/>
+          </a:prstGeom>
+          <a:ln>
+            <a:tailEnd type="triangle"/>
+          </a:ln>
+        </p:spPr>
+        <p:style>
+          <a:lnRef idx="1">
+            <a:schemeClr val="accent1"/>
+          </a:lnRef>
+          <a:fillRef idx="0">
+            <a:schemeClr val="accent1"/>
+          </a:fillRef>
+          <a:effectRef idx="0">
+            <a:schemeClr val="accent1"/>
+          </a:effectRef>
+          <a:fontRef idx="minor">
+            <a:schemeClr val="tx1"/>
+          </a:fontRef>
+        </p:style>
+      </p:cxnSp>
+      <p:cxnSp>
+        <p:nvCxnSpPr>
+          <p:cNvPr id="20" name="Straight Arrow Connector 19">
+            <a:extLst>
+              <a:ext uri="{FF2B5EF4-FFF2-40B4-BE49-F238E27FC236}">
+                <a16:creationId xmlns:a16="http://schemas.microsoft.com/office/drawing/2014/main" id="{E6BEA95E-1841-435A-A556-56686CE83A5E}"/>
+              </a:ext>
+            </a:extLst>
+          </p:cNvPr>
+          <p:cNvCxnSpPr>
+            <a:stCxn id="8" idx="3"/>
+            <a:endCxn id="9" idx="1"/>
+          </p:cNvCxnSpPr>
+          <p:nvPr/>
+        </p:nvCxnSpPr>
+        <p:spPr>
+          <a:xfrm>
+            <a:off x="9681052" y="3013522"/>
+            <a:ext cx="279409" cy="0"/>
+          </a:xfrm>
+          <a:prstGeom prst="straightConnector1">
+            <a:avLst/>
+          </a:prstGeom>
+          <a:ln>
+            <a:tailEnd type="triangle"/>
+          </a:ln>
+        </p:spPr>
+        <p:style>
+          <a:lnRef idx="1">
+            <a:schemeClr val="accent1"/>
+          </a:lnRef>
+          <a:fillRef idx="0">
+            <a:schemeClr val="accent1"/>
+          </a:fillRef>
+          <a:effectRef idx="0">
+            <a:schemeClr val="accent1"/>
+          </a:effectRef>
+          <a:fontRef idx="minor">
+            <a:schemeClr val="tx1"/>
+          </a:fontRef>
+        </p:style>
+      </p:cxnSp>
     </p:spTree>
     <p:extLst>
       <p:ext uri="{BB962C8B-B14F-4D97-AF65-F5344CB8AC3E}">
@@ -4613,15 +4822,7 @@
           <a:p>
             <a:r>
               <a:rPr lang="en-US" dirty="0"/>
-              <a:t>From that figure, we conclude that our model will </a:t>
-            </a:r>
-            <a:r>
-              <a:rPr lang="en-US"/>
-              <a:t>predict the </a:t>
-            </a:r>
-            <a:r>
-              <a:rPr lang="en-US" dirty="0"/>
-              <a:t>employee will get terminated if,</a:t>
+              <a:t>From that figure, we conclude that our model will predict the employee will get terminated if,</a:t>
             </a:r>
           </a:p>
           <a:p>

</xml_diff>